<commit_message>
removed many big files
</commit_message>
<xml_diff>
--- a/docs/highway platoon vehicle pointers.pptx
+++ b/docs/highway platoon vehicle pointers.pptx
@@ -6,6 +6,7 @@
   </p:sldMasterIdLst>
   <p:sldIdLst>
     <p:sldId id="256" r:id="rId2"/>
+    <p:sldId id="257" r:id="rId3"/>
   </p:sldIdLst>
   <p:sldSz cx="12192000" cy="6858000"/>
   <p:notesSz cx="6858000" cy="9144000"/>
@@ -104,6 +105,11 @@
       </a:defRPr>
     </a:lvl9pPr>
   </p:defaultTextStyle>
+  <p:extLst>
+    <p:ext uri="{EFAFB233-063F-42B5-8137-9DF3F51BA10A}">
+      <p15:sldGuideLst xmlns:p15="http://schemas.microsoft.com/office/powerpoint/2012/main"/>
+    </p:ext>
+  </p:extLst>
 </p:presentation>
 </file>
 
@@ -238,7 +244,7 @@
           <a:p>
             <a:fld id="{D20ED7B0-CCBB-4E3A-AD09-CD918F18FD7A}" type="datetimeFigureOut">
               <a:rPr lang="en-US" smtClean="0"/>
-              <a:t>6/21/2015</a:t>
+              <a:t>7/3/2015</a:t>
             </a:fld>
             <a:endParaRPr lang="en-US"/>
           </a:p>
@@ -408,7 +414,7 @@
           <a:p>
             <a:fld id="{D20ED7B0-CCBB-4E3A-AD09-CD918F18FD7A}" type="datetimeFigureOut">
               <a:rPr lang="en-US" smtClean="0"/>
-              <a:t>6/21/2015</a:t>
+              <a:t>7/3/2015</a:t>
             </a:fld>
             <a:endParaRPr lang="en-US"/>
           </a:p>
@@ -588,7 +594,7 @@
           <a:p>
             <a:fld id="{D20ED7B0-CCBB-4E3A-AD09-CD918F18FD7A}" type="datetimeFigureOut">
               <a:rPr lang="en-US" smtClean="0"/>
-              <a:t>6/21/2015</a:t>
+              <a:t>7/3/2015</a:t>
             </a:fld>
             <a:endParaRPr lang="en-US"/>
           </a:p>
@@ -758,7 +764,7 @@
           <a:p>
             <a:fld id="{D20ED7B0-CCBB-4E3A-AD09-CD918F18FD7A}" type="datetimeFigureOut">
               <a:rPr lang="en-US" smtClean="0"/>
-              <a:t>6/21/2015</a:t>
+              <a:t>7/3/2015</a:t>
             </a:fld>
             <a:endParaRPr lang="en-US"/>
           </a:p>
@@ -1004,7 +1010,7 @@
           <a:p>
             <a:fld id="{D20ED7B0-CCBB-4E3A-AD09-CD918F18FD7A}" type="datetimeFigureOut">
               <a:rPr lang="en-US" smtClean="0"/>
-              <a:t>6/21/2015</a:t>
+              <a:t>7/3/2015</a:t>
             </a:fld>
             <a:endParaRPr lang="en-US"/>
           </a:p>
@@ -1236,7 +1242,7 @@
           <a:p>
             <a:fld id="{D20ED7B0-CCBB-4E3A-AD09-CD918F18FD7A}" type="datetimeFigureOut">
               <a:rPr lang="en-US" smtClean="0"/>
-              <a:t>6/21/2015</a:t>
+              <a:t>7/3/2015</a:t>
             </a:fld>
             <a:endParaRPr lang="en-US"/>
           </a:p>
@@ -1603,7 +1609,7 @@
           <a:p>
             <a:fld id="{D20ED7B0-CCBB-4E3A-AD09-CD918F18FD7A}" type="datetimeFigureOut">
               <a:rPr lang="en-US" smtClean="0"/>
-              <a:t>6/21/2015</a:t>
+              <a:t>7/3/2015</a:t>
             </a:fld>
             <a:endParaRPr lang="en-US"/>
           </a:p>
@@ -1721,7 +1727,7 @@
           <a:p>
             <a:fld id="{D20ED7B0-CCBB-4E3A-AD09-CD918F18FD7A}" type="datetimeFigureOut">
               <a:rPr lang="en-US" smtClean="0"/>
-              <a:t>6/21/2015</a:t>
+              <a:t>7/3/2015</a:t>
             </a:fld>
             <a:endParaRPr lang="en-US"/>
           </a:p>
@@ -1816,7 +1822,7 @@
           <a:p>
             <a:fld id="{D20ED7B0-CCBB-4E3A-AD09-CD918F18FD7A}" type="datetimeFigureOut">
               <a:rPr lang="en-US" smtClean="0"/>
-              <a:t>6/21/2015</a:t>
+              <a:t>7/3/2015</a:t>
             </a:fld>
             <a:endParaRPr lang="en-US"/>
           </a:p>
@@ -2093,7 +2099,7 @@
           <a:p>
             <a:fld id="{D20ED7B0-CCBB-4E3A-AD09-CD918F18FD7A}" type="datetimeFigureOut">
               <a:rPr lang="en-US" smtClean="0"/>
-              <a:t>6/21/2015</a:t>
+              <a:t>7/3/2015</a:t>
             </a:fld>
             <a:endParaRPr lang="en-US"/>
           </a:p>
@@ -2346,7 +2352,7 @@
           <a:p>
             <a:fld id="{D20ED7B0-CCBB-4E3A-AD09-CD918F18FD7A}" type="datetimeFigureOut">
               <a:rPr lang="en-US" smtClean="0"/>
-              <a:t>6/21/2015</a:t>
+              <a:t>7/3/2015</a:t>
             </a:fld>
             <a:endParaRPr lang="en-US"/>
           </a:p>
@@ -2559,7 +2565,7 @@
           <a:p>
             <a:fld id="{D20ED7B0-CCBB-4E3A-AD09-CD918F18FD7A}" type="datetimeFigureOut">
               <a:rPr lang="en-US" smtClean="0"/>
-              <a:t>6/21/2015</a:t>
+              <a:t>7/3/2015</a:t>
             </a:fld>
             <a:endParaRPr lang="en-US"/>
           </a:p>
@@ -3859,6 +3865,1156 @@
 </p:sld>
 </file>
 
+<file path=ppt/slides/slide2.xml><?xml version="1.0" encoding="utf-8"?>
+<p:sld xmlns:a="http://schemas.openxmlformats.org/drawingml/2006/main" xmlns:r="http://schemas.openxmlformats.org/officeDocument/2006/relationships" xmlns:p="http://schemas.openxmlformats.org/presentationml/2006/main">
+  <p:cSld>
+    <p:spTree>
+      <p:nvGrpSpPr>
+        <p:cNvPr id="1" name=""/>
+        <p:cNvGrpSpPr/>
+        <p:nvPr/>
+      </p:nvGrpSpPr>
+      <p:grpSpPr>
+        <a:xfrm>
+          <a:off x="0" y="0"/>
+          <a:ext cx="0" cy="0"/>
+          <a:chOff x="0" y="0"/>
+          <a:chExt cx="0" cy="0"/>
+        </a:xfrm>
+      </p:grpSpPr>
+      <p:sp>
+        <p:nvSpPr>
+          <p:cNvPr id="2" name="Title 1"/>
+          <p:cNvSpPr>
+            <a:spLocks noGrp="1"/>
+          </p:cNvSpPr>
+          <p:nvPr>
+            <p:ph type="title"/>
+          </p:nvPr>
+        </p:nvSpPr>
+        <p:spPr/>
+        <p:txBody>
+          <a:bodyPr/>
+          <a:lstStyle/>
+          <a:p>
+            <a:r>
+              <a:rPr lang="en-US" dirty="0" smtClean="0"/>
+              <a:t>Vehicles inside a platoon</a:t>
+            </a:r>
+            <a:endParaRPr lang="en-US" dirty="0"/>
+          </a:p>
+        </p:txBody>
+      </p:sp>
+      <p:sp>
+        <p:nvSpPr>
+          <p:cNvPr id="4" name="Rectangle 3"/>
+          <p:cNvSpPr/>
+          <p:nvPr/>
+        </p:nvSpPr>
+        <p:spPr>
+          <a:xfrm>
+            <a:off x="1040524" y="2372710"/>
+            <a:ext cx="1292774" cy="717331"/>
+          </a:xfrm>
+          <a:prstGeom prst="rect">
+            <a:avLst/>
+          </a:prstGeom>
+        </p:spPr>
+        <p:style>
+          <a:lnRef idx="2">
+            <a:schemeClr val="accent6">
+              <a:shade val="50000"/>
+            </a:schemeClr>
+          </a:lnRef>
+          <a:fillRef idx="1">
+            <a:schemeClr val="accent6"/>
+          </a:fillRef>
+          <a:effectRef idx="0">
+            <a:schemeClr val="accent6"/>
+          </a:effectRef>
+          <a:fontRef idx="minor">
+            <a:schemeClr val="lt1"/>
+          </a:fontRef>
+        </p:style>
+        <p:txBody>
+          <a:bodyPr rtlCol="0" anchor="ctr"/>
+          <a:lstStyle/>
+          <a:p>
+            <a:pPr algn="ctr"/>
+            <a:r>
+              <a:rPr lang="en-US" dirty="0" smtClean="0"/>
+              <a:t>vehicle</a:t>
+            </a:r>
+          </a:p>
+          <a:p>
+            <a:pPr algn="ctr"/>
+            <a:r>
+              <a:rPr lang="en-US" sz="1100" dirty="0" err="1"/>
+              <a:t>p</a:t>
+            </a:r>
+            <a:r>
+              <a:rPr lang="en-US" sz="1100" dirty="0" err="1" smtClean="0"/>
+              <a:t>latoon.vehicle</a:t>
+            </a:r>
+            <a:r>
+              <a:rPr lang="en-US" sz="1100" dirty="0" smtClean="0"/>
+              <a:t>(1)</a:t>
+            </a:r>
+          </a:p>
+        </p:txBody>
+      </p:sp>
+      <p:sp>
+        <p:nvSpPr>
+          <p:cNvPr id="5" name="Rectangle 4"/>
+          <p:cNvSpPr/>
+          <p:nvPr/>
+        </p:nvSpPr>
+        <p:spPr>
+          <a:xfrm>
+            <a:off x="3329151" y="2372709"/>
+            <a:ext cx="1292774" cy="717331"/>
+          </a:xfrm>
+          <a:prstGeom prst="rect">
+            <a:avLst/>
+          </a:prstGeom>
+        </p:spPr>
+        <p:style>
+          <a:lnRef idx="2">
+            <a:schemeClr val="accent6">
+              <a:shade val="50000"/>
+            </a:schemeClr>
+          </a:lnRef>
+          <a:fillRef idx="1">
+            <a:schemeClr val="accent6"/>
+          </a:fillRef>
+          <a:effectRef idx="0">
+            <a:schemeClr val="accent6"/>
+          </a:effectRef>
+          <a:fontRef idx="minor">
+            <a:schemeClr val="lt1"/>
+          </a:fontRef>
+        </p:style>
+        <p:txBody>
+          <a:bodyPr rtlCol="0" anchor="ctr"/>
+          <a:lstStyle/>
+          <a:p>
+            <a:pPr algn="ctr"/>
+            <a:r>
+              <a:rPr lang="en-US" dirty="0" smtClean="0"/>
+              <a:t>vehicle</a:t>
+            </a:r>
+          </a:p>
+          <a:p>
+            <a:pPr algn="ctr"/>
+            <a:r>
+              <a:rPr lang="en-US" sz="1100" dirty="0" err="1" smtClean="0"/>
+              <a:t>platoon.vehicle</a:t>
+            </a:r>
+            <a:r>
+              <a:rPr lang="en-US" sz="1100" dirty="0" smtClean="0"/>
+              <a:t>(2)</a:t>
+            </a:r>
+            <a:endParaRPr lang="en-US" sz="1100" dirty="0" smtClean="0"/>
+          </a:p>
+        </p:txBody>
+      </p:sp>
+      <p:cxnSp>
+        <p:nvCxnSpPr>
+          <p:cNvPr id="7" name="Straight Arrow Connector 6"/>
+          <p:cNvCxnSpPr/>
+          <p:nvPr/>
+        </p:nvCxnSpPr>
+        <p:spPr>
+          <a:xfrm>
+            <a:off x="2333298" y="2372709"/>
+            <a:ext cx="995853" cy="0"/>
+          </a:xfrm>
+          <a:prstGeom prst="straightConnector1">
+            <a:avLst/>
+          </a:prstGeom>
+          <a:ln>
+            <a:tailEnd type="triangle"/>
+          </a:ln>
+        </p:spPr>
+        <p:style>
+          <a:lnRef idx="1">
+            <a:schemeClr val="accent6"/>
+          </a:lnRef>
+          <a:fillRef idx="0">
+            <a:schemeClr val="accent6"/>
+          </a:fillRef>
+          <a:effectRef idx="0">
+            <a:schemeClr val="accent6"/>
+          </a:effectRef>
+          <a:fontRef idx="minor">
+            <a:schemeClr val="tx1"/>
+          </a:fontRef>
+        </p:style>
+      </p:cxnSp>
+      <p:cxnSp>
+        <p:nvCxnSpPr>
+          <p:cNvPr id="11" name="Straight Arrow Connector 10"/>
+          <p:cNvCxnSpPr/>
+          <p:nvPr/>
+        </p:nvCxnSpPr>
+        <p:spPr>
+          <a:xfrm flipH="1">
+            <a:off x="2333298" y="3090040"/>
+            <a:ext cx="995853" cy="1"/>
+          </a:xfrm>
+          <a:prstGeom prst="straightConnector1">
+            <a:avLst/>
+          </a:prstGeom>
+          <a:ln>
+            <a:tailEnd type="triangle"/>
+          </a:ln>
+        </p:spPr>
+        <p:style>
+          <a:lnRef idx="1">
+            <a:schemeClr val="accent6"/>
+          </a:lnRef>
+          <a:fillRef idx="0">
+            <a:schemeClr val="accent6"/>
+          </a:fillRef>
+          <a:effectRef idx="0">
+            <a:schemeClr val="accent6"/>
+          </a:effectRef>
+          <a:fontRef idx="minor">
+            <a:schemeClr val="tx1"/>
+          </a:fontRef>
+        </p:style>
+      </p:cxnSp>
+      <p:sp>
+        <p:nvSpPr>
+          <p:cNvPr id="14" name="TextBox 13"/>
+          <p:cNvSpPr txBox="1"/>
+          <p:nvPr/>
+        </p:nvSpPr>
+        <p:spPr>
+          <a:xfrm>
+            <a:off x="2298620" y="3090040"/>
+            <a:ext cx="942759" cy="307777"/>
+          </a:xfrm>
+          <a:prstGeom prst="rect">
+            <a:avLst/>
+          </a:prstGeom>
+          <a:noFill/>
+        </p:spPr>
+        <p:txBody>
+          <a:bodyPr wrap="none" rtlCol="0">
+            <a:spAutoFit/>
+          </a:bodyPr>
+          <a:lstStyle/>
+          <a:p>
+            <a:r>
+              <a:rPr lang="en-US" sz="1400" dirty="0" err="1" smtClean="0">
+                <a:solidFill>
+                  <a:schemeClr val="accent6"/>
+                </a:solidFill>
+              </a:rPr>
+              <a:t>vehicle.FQ</a:t>
+            </a:r>
+            <a:endParaRPr lang="en-US" sz="1400" dirty="0">
+              <a:solidFill>
+                <a:schemeClr val="accent6"/>
+              </a:solidFill>
+            </a:endParaRPr>
+          </a:p>
+        </p:txBody>
+      </p:sp>
+      <p:sp>
+        <p:nvSpPr>
+          <p:cNvPr id="15" name="TextBox 14"/>
+          <p:cNvSpPr txBox="1"/>
+          <p:nvPr/>
+        </p:nvSpPr>
+        <p:spPr>
+          <a:xfrm>
+            <a:off x="2307037" y="2333457"/>
+            <a:ext cx="960391" cy="307777"/>
+          </a:xfrm>
+          <a:prstGeom prst="rect">
+            <a:avLst/>
+          </a:prstGeom>
+          <a:noFill/>
+        </p:spPr>
+        <p:txBody>
+          <a:bodyPr wrap="none" rtlCol="0">
+            <a:spAutoFit/>
+          </a:bodyPr>
+          <a:lstStyle/>
+          <a:p>
+            <a:r>
+              <a:rPr lang="en-US" sz="1400" dirty="0" err="1" smtClean="0">
+                <a:solidFill>
+                  <a:schemeClr val="accent6"/>
+                </a:solidFill>
+              </a:rPr>
+              <a:t>vehicle.BQ</a:t>
+            </a:r>
+            <a:endParaRPr lang="en-US" sz="1400" dirty="0">
+              <a:solidFill>
+                <a:schemeClr val="accent6"/>
+              </a:solidFill>
+            </a:endParaRPr>
+          </a:p>
+        </p:txBody>
+      </p:sp>
+      <p:sp>
+        <p:nvSpPr>
+          <p:cNvPr id="16" name="Rectangle 15"/>
+          <p:cNvSpPr/>
+          <p:nvPr/>
+        </p:nvSpPr>
+        <p:spPr>
+          <a:xfrm>
+            <a:off x="5617778" y="2372709"/>
+            <a:ext cx="1292774" cy="717331"/>
+          </a:xfrm>
+          <a:prstGeom prst="rect">
+            <a:avLst/>
+          </a:prstGeom>
+        </p:spPr>
+        <p:style>
+          <a:lnRef idx="2">
+            <a:schemeClr val="accent6">
+              <a:shade val="50000"/>
+            </a:schemeClr>
+          </a:lnRef>
+          <a:fillRef idx="1">
+            <a:schemeClr val="accent6"/>
+          </a:fillRef>
+          <a:effectRef idx="0">
+            <a:schemeClr val="accent6"/>
+          </a:effectRef>
+          <a:fontRef idx="minor">
+            <a:schemeClr val="lt1"/>
+          </a:fontRef>
+        </p:style>
+        <p:txBody>
+          <a:bodyPr rtlCol="0" anchor="ctr"/>
+          <a:lstStyle/>
+          <a:p>
+            <a:pPr algn="ctr"/>
+            <a:r>
+              <a:rPr lang="en-US" dirty="0" smtClean="0"/>
+              <a:t>vehicle</a:t>
+            </a:r>
+          </a:p>
+          <a:p>
+            <a:pPr algn="ctr"/>
+            <a:r>
+              <a:rPr lang="en-US" sz="1100" dirty="0" err="1" smtClean="0"/>
+              <a:t>platoon.vehicle</a:t>
+            </a:r>
+            <a:r>
+              <a:rPr lang="en-US" sz="1100" dirty="0" smtClean="0"/>
+              <a:t>(3)</a:t>
+            </a:r>
+            <a:endParaRPr lang="en-US" sz="1100" dirty="0" smtClean="0"/>
+          </a:p>
+        </p:txBody>
+      </p:sp>
+      <p:cxnSp>
+        <p:nvCxnSpPr>
+          <p:cNvPr id="17" name="Straight Arrow Connector 16"/>
+          <p:cNvCxnSpPr/>
+          <p:nvPr/>
+        </p:nvCxnSpPr>
+        <p:spPr>
+          <a:xfrm>
+            <a:off x="4621925" y="2372708"/>
+            <a:ext cx="995853" cy="0"/>
+          </a:xfrm>
+          <a:prstGeom prst="straightConnector1">
+            <a:avLst/>
+          </a:prstGeom>
+          <a:ln>
+            <a:tailEnd type="triangle"/>
+          </a:ln>
+        </p:spPr>
+        <p:style>
+          <a:lnRef idx="1">
+            <a:schemeClr val="accent6"/>
+          </a:lnRef>
+          <a:fillRef idx="0">
+            <a:schemeClr val="accent6"/>
+          </a:fillRef>
+          <a:effectRef idx="0">
+            <a:schemeClr val="accent6"/>
+          </a:effectRef>
+          <a:fontRef idx="minor">
+            <a:schemeClr val="tx1"/>
+          </a:fontRef>
+        </p:style>
+      </p:cxnSp>
+      <p:cxnSp>
+        <p:nvCxnSpPr>
+          <p:cNvPr id="21" name="Straight Arrow Connector 20"/>
+          <p:cNvCxnSpPr/>
+          <p:nvPr/>
+        </p:nvCxnSpPr>
+        <p:spPr>
+          <a:xfrm flipH="1">
+            <a:off x="4621925" y="3090039"/>
+            <a:ext cx="995853" cy="0"/>
+          </a:xfrm>
+          <a:prstGeom prst="straightConnector1">
+            <a:avLst/>
+          </a:prstGeom>
+          <a:ln>
+            <a:tailEnd type="triangle"/>
+          </a:ln>
+        </p:spPr>
+        <p:style>
+          <a:lnRef idx="1">
+            <a:schemeClr val="accent6"/>
+          </a:lnRef>
+          <a:fillRef idx="0">
+            <a:schemeClr val="accent6"/>
+          </a:fillRef>
+          <a:effectRef idx="0">
+            <a:schemeClr val="accent6"/>
+          </a:effectRef>
+          <a:fontRef idx="minor">
+            <a:schemeClr val="tx1"/>
+          </a:fontRef>
+        </p:style>
+      </p:cxnSp>
+      <p:sp>
+        <p:nvSpPr>
+          <p:cNvPr id="25" name="TextBox 24"/>
+          <p:cNvSpPr txBox="1"/>
+          <p:nvPr/>
+        </p:nvSpPr>
+        <p:spPr>
+          <a:xfrm>
+            <a:off x="1056210" y="3090040"/>
+            <a:ext cx="1508298" cy="1600438"/>
+          </a:xfrm>
+          <a:prstGeom prst="rect">
+            <a:avLst/>
+          </a:prstGeom>
+          <a:noFill/>
+        </p:spPr>
+        <p:txBody>
+          <a:bodyPr wrap="none" rtlCol="0">
+            <a:spAutoFit/>
+          </a:bodyPr>
+          <a:lstStyle/>
+          <a:p>
+            <a:r>
+              <a:rPr lang="en-US" sz="1400" dirty="0" smtClean="0"/>
+              <a:t>.q = ‘leader’</a:t>
+            </a:r>
+          </a:p>
+          <a:p>
+            <a:r>
+              <a:rPr lang="en-US" sz="1400" dirty="0" smtClean="0"/>
+              <a:t>.</a:t>
+            </a:r>
+            <a:r>
+              <a:rPr lang="en-US" sz="1400" dirty="0" err="1" smtClean="0"/>
+              <a:t>idx</a:t>
+            </a:r>
+            <a:r>
+              <a:rPr lang="en-US" sz="1400" dirty="0" smtClean="0"/>
+              <a:t> = 1</a:t>
+            </a:r>
+          </a:p>
+          <a:p>
+            <a:r>
+              <a:rPr lang="en-US" sz="1400" dirty="0" smtClean="0"/>
+              <a:t>.Leader = (itself)</a:t>
+            </a:r>
+          </a:p>
+          <a:p>
+            <a:r>
+              <a:rPr lang="en-US" sz="1400" dirty="0" smtClean="0"/>
+              <a:t>.FQ = (itself)</a:t>
+            </a:r>
+          </a:p>
+          <a:p>
+            <a:r>
+              <a:rPr lang="en-US" sz="1400" dirty="0" smtClean="0"/>
+              <a:t>.BQ = .</a:t>
+            </a:r>
+            <a:r>
+              <a:rPr lang="en-US" sz="1400" dirty="0" err="1" smtClean="0"/>
+              <a:t>p.vehicle</a:t>
+            </a:r>
+            <a:r>
+              <a:rPr lang="en-US" sz="1400" dirty="0" smtClean="0"/>
+              <a:t>(2)</a:t>
+            </a:r>
+          </a:p>
+          <a:p>
+            <a:endParaRPr lang="en-US" sz="1400" dirty="0" smtClean="0"/>
+          </a:p>
+          <a:p>
+            <a:endParaRPr lang="en-US" sz="1400" dirty="0"/>
+          </a:p>
+        </p:txBody>
+      </p:sp>
+      <p:sp>
+        <p:nvSpPr>
+          <p:cNvPr id="26" name="TextBox 25"/>
+          <p:cNvSpPr txBox="1"/>
+          <p:nvPr/>
+        </p:nvSpPr>
+        <p:spPr>
+          <a:xfrm>
+            <a:off x="3293372" y="3078378"/>
+            <a:ext cx="1788823" cy="1600438"/>
+          </a:xfrm>
+          <a:prstGeom prst="rect">
+            <a:avLst/>
+          </a:prstGeom>
+          <a:noFill/>
+        </p:spPr>
+        <p:txBody>
+          <a:bodyPr wrap="none" rtlCol="0">
+            <a:spAutoFit/>
+          </a:bodyPr>
+          <a:lstStyle/>
+          <a:p>
+            <a:r>
+              <a:rPr lang="en-US" sz="1400" dirty="0" smtClean="0"/>
+              <a:t>.q = ‘follower’</a:t>
+            </a:r>
+          </a:p>
+          <a:p>
+            <a:r>
+              <a:rPr lang="en-US" sz="1400" dirty="0" smtClean="0"/>
+              <a:t>.</a:t>
+            </a:r>
+            <a:r>
+              <a:rPr lang="en-US" sz="1400" dirty="0" err="1" smtClean="0"/>
+              <a:t>idx</a:t>
+            </a:r>
+            <a:r>
+              <a:rPr lang="en-US" sz="1400" dirty="0" smtClean="0"/>
+              <a:t> = 2</a:t>
+            </a:r>
+          </a:p>
+          <a:p>
+            <a:r>
+              <a:rPr lang="en-US" sz="1400" dirty="0" smtClean="0"/>
+              <a:t>.Leader = .</a:t>
+            </a:r>
+            <a:r>
+              <a:rPr lang="en-US" sz="1400" dirty="0" err="1" smtClean="0"/>
+              <a:t>p.vehicle</a:t>
+            </a:r>
+            <a:r>
+              <a:rPr lang="en-US" sz="1400" dirty="0" smtClean="0"/>
+              <a:t>(1)</a:t>
+            </a:r>
+          </a:p>
+          <a:p>
+            <a:r>
+              <a:rPr lang="en-US" sz="1400" dirty="0" smtClean="0"/>
+              <a:t>.FQ = .</a:t>
+            </a:r>
+            <a:r>
+              <a:rPr lang="en-US" sz="1400" dirty="0" err="1" smtClean="0"/>
+              <a:t>p.vehicle</a:t>
+            </a:r>
+            <a:r>
+              <a:rPr lang="en-US" sz="1400" dirty="0" smtClean="0"/>
+              <a:t>(1)</a:t>
+            </a:r>
+          </a:p>
+          <a:p>
+            <a:r>
+              <a:rPr lang="en-US" sz="1400" dirty="0" smtClean="0"/>
+              <a:t>.BQ = .</a:t>
+            </a:r>
+            <a:r>
+              <a:rPr lang="en-US" sz="1400" dirty="0" err="1" smtClean="0"/>
+              <a:t>p.vehicle</a:t>
+            </a:r>
+            <a:r>
+              <a:rPr lang="en-US" sz="1400" dirty="0" smtClean="0"/>
+              <a:t>(3)</a:t>
+            </a:r>
+          </a:p>
+          <a:p>
+            <a:endParaRPr lang="en-US" sz="1400" dirty="0" smtClean="0"/>
+          </a:p>
+          <a:p>
+            <a:endParaRPr lang="en-US" sz="1400" dirty="0"/>
+          </a:p>
+        </p:txBody>
+      </p:sp>
+      <p:sp>
+        <p:nvSpPr>
+          <p:cNvPr id="27" name="Rectangle 26"/>
+          <p:cNvSpPr/>
+          <p:nvPr/>
+        </p:nvSpPr>
+        <p:spPr>
+          <a:xfrm>
+            <a:off x="7906405" y="2372708"/>
+            <a:ext cx="1292774" cy="717331"/>
+          </a:xfrm>
+          <a:prstGeom prst="rect">
+            <a:avLst/>
+          </a:prstGeom>
+        </p:spPr>
+        <p:style>
+          <a:lnRef idx="2">
+            <a:schemeClr val="accent6">
+              <a:shade val="50000"/>
+            </a:schemeClr>
+          </a:lnRef>
+          <a:fillRef idx="1">
+            <a:schemeClr val="accent6"/>
+          </a:fillRef>
+          <a:effectRef idx="0">
+            <a:schemeClr val="accent6"/>
+          </a:effectRef>
+          <a:fontRef idx="minor">
+            <a:schemeClr val="lt1"/>
+          </a:fontRef>
+        </p:style>
+        <p:txBody>
+          <a:bodyPr rtlCol="0" anchor="ctr"/>
+          <a:lstStyle/>
+          <a:p>
+            <a:pPr algn="ctr"/>
+            <a:r>
+              <a:rPr lang="en-US" dirty="0" smtClean="0"/>
+              <a:t>vehicle</a:t>
+            </a:r>
+          </a:p>
+          <a:p>
+            <a:pPr algn="ctr"/>
+            <a:r>
+              <a:rPr lang="en-US" sz="1100" dirty="0" err="1" smtClean="0"/>
+              <a:t>platoon.vehicle</a:t>
+            </a:r>
+            <a:r>
+              <a:rPr lang="en-US" sz="1100" dirty="0" smtClean="0"/>
+              <a:t>(3)</a:t>
+            </a:r>
+            <a:endParaRPr lang="en-US" sz="1100" dirty="0" smtClean="0"/>
+          </a:p>
+        </p:txBody>
+      </p:sp>
+      <p:cxnSp>
+        <p:nvCxnSpPr>
+          <p:cNvPr id="28" name="Straight Arrow Connector 27"/>
+          <p:cNvCxnSpPr/>
+          <p:nvPr/>
+        </p:nvCxnSpPr>
+        <p:spPr>
+          <a:xfrm>
+            <a:off x="6910552" y="2372707"/>
+            <a:ext cx="995853" cy="0"/>
+          </a:xfrm>
+          <a:prstGeom prst="straightConnector1">
+            <a:avLst/>
+          </a:prstGeom>
+          <a:ln>
+            <a:tailEnd type="triangle"/>
+          </a:ln>
+        </p:spPr>
+        <p:style>
+          <a:lnRef idx="1">
+            <a:schemeClr val="accent6"/>
+          </a:lnRef>
+          <a:fillRef idx="0">
+            <a:schemeClr val="accent6"/>
+          </a:fillRef>
+          <a:effectRef idx="0">
+            <a:schemeClr val="accent6"/>
+          </a:effectRef>
+          <a:fontRef idx="minor">
+            <a:schemeClr val="tx1"/>
+          </a:fontRef>
+        </p:style>
+      </p:cxnSp>
+      <p:cxnSp>
+        <p:nvCxnSpPr>
+          <p:cNvPr id="30" name="Straight Arrow Connector 29"/>
+          <p:cNvCxnSpPr/>
+          <p:nvPr/>
+        </p:nvCxnSpPr>
+        <p:spPr>
+          <a:xfrm flipH="1" flipV="1">
+            <a:off x="6890706" y="3090038"/>
+            <a:ext cx="1015699" cy="2"/>
+          </a:xfrm>
+          <a:prstGeom prst="straightConnector1">
+            <a:avLst/>
+          </a:prstGeom>
+          <a:ln>
+            <a:tailEnd type="triangle"/>
+          </a:ln>
+        </p:spPr>
+        <p:style>
+          <a:lnRef idx="1">
+            <a:schemeClr val="accent6"/>
+          </a:lnRef>
+          <a:fillRef idx="0">
+            <a:schemeClr val="accent6"/>
+          </a:fillRef>
+          <a:effectRef idx="0">
+            <a:schemeClr val="accent6"/>
+          </a:effectRef>
+          <a:fontRef idx="minor">
+            <a:schemeClr val="tx1"/>
+          </a:fontRef>
+        </p:style>
+      </p:cxnSp>
+      <p:sp>
+        <p:nvSpPr>
+          <p:cNvPr id="37" name="TextBox 36"/>
+          <p:cNvSpPr txBox="1"/>
+          <p:nvPr/>
+        </p:nvSpPr>
+        <p:spPr>
+          <a:xfrm>
+            <a:off x="7906405" y="3090040"/>
+            <a:ext cx="1788823" cy="1600438"/>
+          </a:xfrm>
+          <a:prstGeom prst="rect">
+            <a:avLst/>
+          </a:prstGeom>
+          <a:noFill/>
+        </p:spPr>
+        <p:txBody>
+          <a:bodyPr wrap="none" rtlCol="0">
+            <a:spAutoFit/>
+          </a:bodyPr>
+          <a:lstStyle/>
+          <a:p>
+            <a:r>
+              <a:rPr lang="en-US" sz="1400" dirty="0" smtClean="0"/>
+              <a:t>.q = ‘follower’</a:t>
+            </a:r>
+          </a:p>
+          <a:p>
+            <a:r>
+              <a:rPr lang="en-US" sz="1400" dirty="0" smtClean="0"/>
+              <a:t>.</a:t>
+            </a:r>
+            <a:r>
+              <a:rPr lang="en-US" sz="1400" dirty="0" err="1" smtClean="0"/>
+              <a:t>idx</a:t>
+            </a:r>
+            <a:r>
+              <a:rPr lang="en-US" sz="1400" dirty="0" smtClean="0"/>
+              <a:t> = 4</a:t>
+            </a:r>
+          </a:p>
+          <a:p>
+            <a:r>
+              <a:rPr lang="en-US" sz="1400" dirty="0" smtClean="0"/>
+              <a:t>.Leader = .</a:t>
+            </a:r>
+            <a:r>
+              <a:rPr lang="en-US" sz="1400" dirty="0" err="1" smtClean="0"/>
+              <a:t>p.vehicle</a:t>
+            </a:r>
+            <a:r>
+              <a:rPr lang="en-US" sz="1400" dirty="0" smtClean="0"/>
+              <a:t>(1)</a:t>
+            </a:r>
+          </a:p>
+          <a:p>
+            <a:r>
+              <a:rPr lang="en-US" sz="1400" dirty="0" smtClean="0"/>
+              <a:t>.FQ = .</a:t>
+            </a:r>
+            <a:r>
+              <a:rPr lang="en-US" sz="1400" dirty="0" err="1" smtClean="0"/>
+              <a:t>p.vehicle</a:t>
+            </a:r>
+            <a:r>
+              <a:rPr lang="en-US" sz="1400" dirty="0" smtClean="0"/>
+              <a:t>(3)</a:t>
+            </a:r>
+          </a:p>
+          <a:p>
+            <a:r>
+              <a:rPr lang="en-US" sz="1400" dirty="0" smtClean="0"/>
+              <a:t>.BQ = (itself)</a:t>
+            </a:r>
+          </a:p>
+          <a:p>
+            <a:endParaRPr lang="en-US" sz="1400" dirty="0" smtClean="0"/>
+          </a:p>
+          <a:p>
+            <a:endParaRPr lang="en-US" sz="1400" dirty="0"/>
+          </a:p>
+        </p:txBody>
+      </p:sp>
+      <p:cxnSp>
+        <p:nvCxnSpPr>
+          <p:cNvPr id="46" name="Straight Connector 45"/>
+          <p:cNvCxnSpPr>
+            <a:stCxn id="5" idx="0"/>
+          </p:cNvCxnSpPr>
+          <p:nvPr/>
+        </p:nvCxnSpPr>
+        <p:spPr>
+          <a:xfrm flipV="1">
+            <a:off x="3975538" y="1907628"/>
+            <a:ext cx="0" cy="465081"/>
+          </a:xfrm>
+          <a:prstGeom prst="line">
+            <a:avLst/>
+          </a:prstGeom>
+        </p:spPr>
+        <p:style>
+          <a:lnRef idx="1">
+            <a:schemeClr val="accent6"/>
+          </a:lnRef>
+          <a:fillRef idx="0">
+            <a:schemeClr val="accent6"/>
+          </a:fillRef>
+          <a:effectRef idx="0">
+            <a:schemeClr val="accent6"/>
+          </a:effectRef>
+          <a:fontRef idx="minor">
+            <a:schemeClr val="tx1"/>
+          </a:fontRef>
+        </p:style>
+      </p:cxnSp>
+      <p:cxnSp>
+        <p:nvCxnSpPr>
+          <p:cNvPr id="49" name="Straight Connector 48"/>
+          <p:cNvCxnSpPr>
+            <a:stCxn id="16" idx="0"/>
+          </p:cNvCxnSpPr>
+          <p:nvPr/>
+        </p:nvCxnSpPr>
+        <p:spPr>
+          <a:xfrm flipV="1">
+            <a:off x="6264165" y="1907629"/>
+            <a:ext cx="0" cy="465080"/>
+          </a:xfrm>
+          <a:prstGeom prst="line">
+            <a:avLst/>
+          </a:prstGeom>
+        </p:spPr>
+        <p:style>
+          <a:lnRef idx="1">
+            <a:schemeClr val="accent6"/>
+          </a:lnRef>
+          <a:fillRef idx="0">
+            <a:schemeClr val="accent6"/>
+          </a:fillRef>
+          <a:effectRef idx="0">
+            <a:schemeClr val="accent6"/>
+          </a:effectRef>
+          <a:fontRef idx="minor">
+            <a:schemeClr val="tx1"/>
+          </a:fontRef>
+        </p:style>
+      </p:cxnSp>
+      <p:cxnSp>
+        <p:nvCxnSpPr>
+          <p:cNvPr id="51" name="Straight Connector 50"/>
+          <p:cNvCxnSpPr>
+            <a:stCxn id="27" idx="0"/>
+          </p:cNvCxnSpPr>
+          <p:nvPr/>
+        </p:nvCxnSpPr>
+        <p:spPr>
+          <a:xfrm flipH="1" flipV="1">
+            <a:off x="8544909" y="1907628"/>
+            <a:ext cx="7883" cy="465080"/>
+          </a:xfrm>
+          <a:prstGeom prst="line">
+            <a:avLst/>
+          </a:prstGeom>
+        </p:spPr>
+        <p:style>
+          <a:lnRef idx="1">
+            <a:schemeClr val="accent6"/>
+          </a:lnRef>
+          <a:fillRef idx="0">
+            <a:schemeClr val="accent6"/>
+          </a:fillRef>
+          <a:effectRef idx="0">
+            <a:schemeClr val="accent6"/>
+          </a:effectRef>
+          <a:fontRef idx="minor">
+            <a:schemeClr val="tx1"/>
+          </a:fontRef>
+        </p:style>
+      </p:cxnSp>
+      <p:cxnSp>
+        <p:nvCxnSpPr>
+          <p:cNvPr id="54" name="Straight Connector 53"/>
+          <p:cNvCxnSpPr/>
+          <p:nvPr/>
+        </p:nvCxnSpPr>
+        <p:spPr>
+          <a:xfrm flipH="1">
+            <a:off x="1682970" y="1907628"/>
+            <a:ext cx="6851417" cy="0"/>
+          </a:xfrm>
+          <a:prstGeom prst="line">
+            <a:avLst/>
+          </a:prstGeom>
+        </p:spPr>
+        <p:style>
+          <a:lnRef idx="1">
+            <a:schemeClr val="accent6"/>
+          </a:lnRef>
+          <a:fillRef idx="0">
+            <a:schemeClr val="accent6"/>
+          </a:fillRef>
+          <a:effectRef idx="0">
+            <a:schemeClr val="accent6"/>
+          </a:effectRef>
+          <a:fontRef idx="minor">
+            <a:schemeClr val="tx1"/>
+          </a:fontRef>
+        </p:style>
+      </p:cxnSp>
+      <p:cxnSp>
+        <p:nvCxnSpPr>
+          <p:cNvPr id="56" name="Straight Arrow Connector 55"/>
+          <p:cNvCxnSpPr>
+            <a:endCxn id="4" idx="0"/>
+          </p:cNvCxnSpPr>
+          <p:nvPr/>
+        </p:nvCxnSpPr>
+        <p:spPr>
+          <a:xfrm>
+            <a:off x="1686911" y="1907628"/>
+            <a:ext cx="0" cy="465082"/>
+          </a:xfrm>
+          <a:prstGeom prst="straightConnector1">
+            <a:avLst/>
+          </a:prstGeom>
+          <a:ln>
+            <a:tailEnd type="triangle"/>
+          </a:ln>
+        </p:spPr>
+        <p:style>
+          <a:lnRef idx="1">
+            <a:schemeClr val="accent6"/>
+          </a:lnRef>
+          <a:fillRef idx="0">
+            <a:schemeClr val="accent6"/>
+          </a:fillRef>
+          <a:effectRef idx="0">
+            <a:schemeClr val="accent6"/>
+          </a:effectRef>
+          <a:fontRef idx="minor">
+            <a:schemeClr val="tx1"/>
+          </a:fontRef>
+        </p:style>
+      </p:cxnSp>
+      <p:sp>
+        <p:nvSpPr>
+          <p:cNvPr id="57" name="TextBox 56"/>
+          <p:cNvSpPr txBox="1"/>
+          <p:nvPr/>
+        </p:nvSpPr>
+        <p:spPr>
+          <a:xfrm>
+            <a:off x="4247680" y="1570821"/>
+            <a:ext cx="1559786" cy="369332"/>
+          </a:xfrm>
+          <a:prstGeom prst="rect">
+            <a:avLst/>
+          </a:prstGeom>
+          <a:noFill/>
+        </p:spPr>
+        <p:txBody>
+          <a:bodyPr wrap="none" rtlCol="0">
+            <a:spAutoFit/>
+          </a:bodyPr>
+          <a:lstStyle/>
+          <a:p>
+            <a:r>
+              <a:rPr lang="en-US" dirty="0" err="1" smtClean="0">
+                <a:solidFill>
+                  <a:schemeClr val="accent6"/>
+                </a:solidFill>
+              </a:rPr>
+              <a:t>Vehicle.Leader</a:t>
+            </a:r>
+            <a:endParaRPr lang="en-US" dirty="0">
+              <a:solidFill>
+                <a:schemeClr val="accent6"/>
+              </a:solidFill>
+            </a:endParaRPr>
+          </a:p>
+        </p:txBody>
+      </p:sp>
+      <p:sp>
+        <p:nvSpPr>
+          <p:cNvPr id="58" name="TextBox 57"/>
+          <p:cNvSpPr txBox="1"/>
+          <p:nvPr/>
+        </p:nvSpPr>
+        <p:spPr>
+          <a:xfrm>
+            <a:off x="4627594" y="3090040"/>
+            <a:ext cx="942759" cy="307777"/>
+          </a:xfrm>
+          <a:prstGeom prst="rect">
+            <a:avLst/>
+          </a:prstGeom>
+          <a:noFill/>
+        </p:spPr>
+        <p:txBody>
+          <a:bodyPr wrap="none" rtlCol="0">
+            <a:spAutoFit/>
+          </a:bodyPr>
+          <a:lstStyle/>
+          <a:p>
+            <a:r>
+              <a:rPr lang="en-US" sz="1400" dirty="0" err="1" smtClean="0">
+                <a:solidFill>
+                  <a:schemeClr val="accent6"/>
+                </a:solidFill>
+              </a:rPr>
+              <a:t>vehicle.FQ</a:t>
+            </a:r>
+            <a:endParaRPr lang="en-US" sz="1400" dirty="0">
+              <a:solidFill>
+                <a:schemeClr val="accent6"/>
+              </a:solidFill>
+            </a:endParaRPr>
+          </a:p>
+        </p:txBody>
+      </p:sp>
+      <p:sp>
+        <p:nvSpPr>
+          <p:cNvPr id="59" name="TextBox 58"/>
+          <p:cNvSpPr txBox="1"/>
+          <p:nvPr/>
+        </p:nvSpPr>
+        <p:spPr>
+          <a:xfrm>
+            <a:off x="4636011" y="2333457"/>
+            <a:ext cx="960391" cy="307777"/>
+          </a:xfrm>
+          <a:prstGeom prst="rect">
+            <a:avLst/>
+          </a:prstGeom>
+          <a:noFill/>
+        </p:spPr>
+        <p:txBody>
+          <a:bodyPr wrap="none" rtlCol="0">
+            <a:spAutoFit/>
+          </a:bodyPr>
+          <a:lstStyle/>
+          <a:p>
+            <a:r>
+              <a:rPr lang="en-US" sz="1400" dirty="0" err="1" smtClean="0">
+                <a:solidFill>
+                  <a:schemeClr val="accent6"/>
+                </a:solidFill>
+              </a:rPr>
+              <a:t>vehicle.BQ</a:t>
+            </a:r>
+            <a:endParaRPr lang="en-US" sz="1400" dirty="0">
+              <a:solidFill>
+                <a:schemeClr val="accent6"/>
+              </a:solidFill>
+            </a:endParaRPr>
+          </a:p>
+        </p:txBody>
+      </p:sp>
+      <p:sp>
+        <p:nvSpPr>
+          <p:cNvPr id="60" name="TextBox 59"/>
+          <p:cNvSpPr txBox="1"/>
+          <p:nvPr/>
+        </p:nvSpPr>
+        <p:spPr>
+          <a:xfrm>
+            <a:off x="6891558" y="3090040"/>
+            <a:ext cx="942759" cy="307777"/>
+          </a:xfrm>
+          <a:prstGeom prst="rect">
+            <a:avLst/>
+          </a:prstGeom>
+          <a:noFill/>
+        </p:spPr>
+        <p:txBody>
+          <a:bodyPr wrap="none" rtlCol="0">
+            <a:spAutoFit/>
+          </a:bodyPr>
+          <a:lstStyle/>
+          <a:p>
+            <a:r>
+              <a:rPr lang="en-US" sz="1400" dirty="0" err="1" smtClean="0">
+                <a:solidFill>
+                  <a:schemeClr val="accent6"/>
+                </a:solidFill>
+              </a:rPr>
+              <a:t>vehicle.FQ</a:t>
+            </a:r>
+            <a:endParaRPr lang="en-US" sz="1400" dirty="0">
+              <a:solidFill>
+                <a:schemeClr val="accent6"/>
+              </a:solidFill>
+            </a:endParaRPr>
+          </a:p>
+        </p:txBody>
+      </p:sp>
+      <p:sp>
+        <p:nvSpPr>
+          <p:cNvPr id="61" name="TextBox 60"/>
+          <p:cNvSpPr txBox="1"/>
+          <p:nvPr/>
+        </p:nvSpPr>
+        <p:spPr>
+          <a:xfrm>
+            <a:off x="6899975" y="2333457"/>
+            <a:ext cx="960391" cy="307777"/>
+          </a:xfrm>
+          <a:prstGeom prst="rect">
+            <a:avLst/>
+          </a:prstGeom>
+          <a:noFill/>
+        </p:spPr>
+        <p:txBody>
+          <a:bodyPr wrap="none" rtlCol="0">
+            <a:spAutoFit/>
+          </a:bodyPr>
+          <a:lstStyle/>
+          <a:p>
+            <a:r>
+              <a:rPr lang="en-US" sz="1400" dirty="0" err="1" smtClean="0">
+                <a:solidFill>
+                  <a:schemeClr val="accent6"/>
+                </a:solidFill>
+              </a:rPr>
+              <a:t>vehicle.BQ</a:t>
+            </a:r>
+            <a:endParaRPr lang="en-US" sz="1400" dirty="0">
+              <a:solidFill>
+                <a:schemeClr val="accent6"/>
+              </a:solidFill>
+            </a:endParaRPr>
+          </a:p>
+        </p:txBody>
+      </p:sp>
+    </p:spTree>
+    <p:extLst>
+      <p:ext uri="{BB962C8B-B14F-4D97-AF65-F5344CB8AC3E}">
+        <p14:creationId xmlns:p14="http://schemas.microsoft.com/office/powerpoint/2010/main" val="187052802"/>
+      </p:ext>
+    </p:extLst>
+  </p:cSld>
+  <p:clrMapOvr>
+    <a:masterClrMapping/>
+  </p:clrMapOvr>
+</p:sld>
+</file>
+
 <file path=ppt/theme/theme1.xml><?xml version="1.0" encoding="utf-8"?>
 <a:theme xmlns:a="http://schemas.openxmlformats.org/drawingml/2006/main" name="Office Theme">
   <a:themeElements>

</xml_diff>